<commit_message>
Changed wording of state of the art, added Kaushik to author list
</commit_message>
<xml_diff>
--- a/Documentation/Poster/Poster-justified.pptx
+++ b/Documentation/Poster/Poster-justified.pptx
@@ -2,12 +2,12 @@
 <file path=ppt/presentation.xml><?xml version="1.0" encoding="utf-8"?>
 <p:presentation xmlns:a="http://schemas.openxmlformats.org/drawingml/2006/main" xmlns:r="http://schemas.openxmlformats.org/officeDocument/2006/relationships" xmlns:p="http://schemas.openxmlformats.org/presentationml/2006/main" saveSubsetFonts="1">
   <p:sldMasterIdLst>
-    <p:sldMasterId id="2147483660" r:id="rId1"/>
+    <p:sldMasterId id="2147483672" r:id="rId1"/>
   </p:sldMasterIdLst>
   <p:sldIdLst>
     <p:sldId id="256" r:id="rId2"/>
   </p:sldIdLst>
-  <p:sldSz cx="21383625" cy="30275213"/>
+  <p:sldSz cx="21563013" cy="30454600"/>
   <p:notesSz cx="6858000" cy="9144000"/>
   <p:defaultTextStyle>
     <a:defPPr>
@@ -141,15 +141,15 @@
         </p:nvSpPr>
         <p:spPr>
           <a:xfrm>
-            <a:off x="1603772" y="4954765"/>
-            <a:ext cx="18176081" cy="10540259"/>
+            <a:off x="1617226" y="4984123"/>
+            <a:ext cx="18328561" cy="10602713"/>
           </a:xfrm>
         </p:spPr>
         <p:txBody>
           <a:bodyPr anchor="b"/>
           <a:lstStyle>
             <a:lvl1pPr algn="ctr">
-              <a:defRPr sz="14031"/>
+              <a:defRPr sz="14149"/>
             </a:lvl1pPr>
           </a:lstStyle>
           <a:p>
@@ -173,8 +173,8 @@
         </p:nvSpPr>
         <p:spPr>
           <a:xfrm>
-            <a:off x="2672953" y="15901497"/>
-            <a:ext cx="16037719" cy="7309499"/>
+            <a:off x="2695377" y="15995717"/>
+            <a:ext cx="16172260" cy="7352810"/>
           </a:xfrm>
         </p:spPr>
         <p:txBody>
@@ -182,39 +182,39 @@
           <a:lstStyle>
             <a:lvl1pPr marL="0" indent="0" algn="ctr">
               <a:buNone/>
-              <a:defRPr sz="5612"/>
+              <a:defRPr sz="5660"/>
             </a:lvl1pPr>
-            <a:lvl2pPr marL="1069162" indent="0" algn="ctr">
-              <a:buNone/>
-              <a:defRPr sz="4677"/>
+            <a:lvl2pPr marL="1078169" indent="0" algn="ctr">
+              <a:buNone/>
+              <a:defRPr sz="4716"/>
             </a:lvl2pPr>
-            <a:lvl3pPr marL="2138324" indent="0" algn="ctr">
-              <a:buNone/>
-              <a:defRPr sz="4209"/>
+            <a:lvl3pPr marL="2156338" indent="0" algn="ctr">
+              <a:buNone/>
+              <a:defRPr sz="4245"/>
             </a:lvl3pPr>
-            <a:lvl4pPr marL="3207487" indent="0" algn="ctr">
-              <a:buNone/>
-              <a:defRPr sz="3742"/>
+            <a:lvl4pPr marL="3234507" indent="0" algn="ctr">
+              <a:buNone/>
+              <a:defRPr sz="3773"/>
             </a:lvl4pPr>
-            <a:lvl5pPr marL="4276649" indent="0" algn="ctr">
-              <a:buNone/>
-              <a:defRPr sz="3742"/>
+            <a:lvl5pPr marL="4312676" indent="0" algn="ctr">
+              <a:buNone/>
+              <a:defRPr sz="3773"/>
             </a:lvl5pPr>
-            <a:lvl6pPr marL="5345811" indent="0" algn="ctr">
-              <a:buNone/>
-              <a:defRPr sz="3742"/>
+            <a:lvl6pPr marL="5390845" indent="0" algn="ctr">
+              <a:buNone/>
+              <a:defRPr sz="3773"/>
             </a:lvl6pPr>
-            <a:lvl7pPr marL="6414973" indent="0" algn="ctr">
-              <a:buNone/>
-              <a:defRPr sz="3742"/>
+            <a:lvl7pPr marL="6469014" indent="0" algn="ctr">
+              <a:buNone/>
+              <a:defRPr sz="3773"/>
             </a:lvl7pPr>
-            <a:lvl8pPr marL="7484135" indent="0" algn="ctr">
-              <a:buNone/>
-              <a:defRPr sz="3742"/>
+            <a:lvl8pPr marL="7547183" indent="0" algn="ctr">
+              <a:buNone/>
+              <a:defRPr sz="3773"/>
             </a:lvl8pPr>
-            <a:lvl9pPr marL="8553298" indent="0" algn="ctr">
-              <a:buNone/>
-              <a:defRPr sz="3742"/>
+            <a:lvl9pPr marL="8625352" indent="0" algn="ctr">
+              <a:buNone/>
+              <a:defRPr sz="3773"/>
             </a:lvl9pPr>
           </a:lstStyle>
           <a:p>
@@ -243,7 +243,7 @@
           <a:p>
             <a:fld id="{3463DB28-6E68-436C-B067-02619AAB958B}" type="datetimeFigureOut">
               <a:rPr lang="en-AU" smtClean="0"/>
-              <a:t>19/06/2020</a:t>
+              <a:t>30/06/2020</a:t>
             </a:fld>
             <a:endParaRPr lang="en-AU"/>
           </a:p>
@@ -294,7 +294,7 @@
     </p:spTree>
     <p:extLst>
       <p:ext uri="{BB962C8B-B14F-4D97-AF65-F5344CB8AC3E}">
-        <p14:creationId xmlns:p14="http://schemas.microsoft.com/office/powerpoint/2010/main" val="2463962931"/>
+        <p14:creationId xmlns:p14="http://schemas.microsoft.com/office/powerpoint/2010/main" val="1013421518"/>
       </p:ext>
     </p:extLst>
   </p:cSld>
@@ -413,7 +413,7 @@
           <a:p>
             <a:fld id="{3463DB28-6E68-436C-B067-02619AAB958B}" type="datetimeFigureOut">
               <a:rPr lang="en-AU" smtClean="0"/>
-              <a:t>19/06/2020</a:t>
+              <a:t>30/06/2020</a:t>
             </a:fld>
             <a:endParaRPr lang="en-AU"/>
           </a:p>
@@ -464,7 +464,7 @@
     </p:spTree>
     <p:extLst>
       <p:ext uri="{BB962C8B-B14F-4D97-AF65-F5344CB8AC3E}">
-        <p14:creationId xmlns:p14="http://schemas.microsoft.com/office/powerpoint/2010/main" val="4157377718"/>
+        <p14:creationId xmlns:p14="http://schemas.microsoft.com/office/powerpoint/2010/main" val="3927458025"/>
       </p:ext>
     </p:extLst>
   </p:cSld>
@@ -503,8 +503,8 @@
         </p:nvSpPr>
         <p:spPr>
           <a:xfrm>
-            <a:off x="15302658" y="1611875"/>
-            <a:ext cx="4610844" cy="25656844"/>
+            <a:off x="15431032" y="1621425"/>
+            <a:ext cx="4649525" cy="25808866"/>
           </a:xfrm>
         </p:spPr>
         <p:txBody>
@@ -531,8 +531,8 @@
         </p:nvSpPr>
         <p:spPr>
           <a:xfrm>
-            <a:off x="1470125" y="1611875"/>
-            <a:ext cx="13565237" cy="25656844"/>
+            <a:off x="1482459" y="1621425"/>
+            <a:ext cx="13679036" cy="25808866"/>
           </a:xfrm>
         </p:spPr>
         <p:txBody>
@@ -593,7 +593,7 @@
           <a:p>
             <a:fld id="{3463DB28-6E68-436C-B067-02619AAB958B}" type="datetimeFigureOut">
               <a:rPr lang="en-AU" smtClean="0"/>
-              <a:t>19/06/2020</a:t>
+              <a:t>30/06/2020</a:t>
             </a:fld>
             <a:endParaRPr lang="en-AU"/>
           </a:p>
@@ -644,7 +644,7 @@
     </p:spTree>
     <p:extLst>
       <p:ext uri="{BB962C8B-B14F-4D97-AF65-F5344CB8AC3E}">
-        <p14:creationId xmlns:p14="http://schemas.microsoft.com/office/powerpoint/2010/main" val="2776960116"/>
+        <p14:creationId xmlns:p14="http://schemas.microsoft.com/office/powerpoint/2010/main" val="1201808031"/>
       </p:ext>
     </p:extLst>
   </p:cSld>
@@ -763,7 +763,7 @@
           <a:p>
             <a:fld id="{3463DB28-6E68-436C-B067-02619AAB958B}" type="datetimeFigureOut">
               <a:rPr lang="en-AU" smtClean="0"/>
-              <a:t>19/06/2020</a:t>
+              <a:t>30/06/2020</a:t>
             </a:fld>
             <a:endParaRPr lang="en-AU"/>
           </a:p>
@@ -814,7 +814,7 @@
     </p:spTree>
     <p:extLst>
       <p:ext uri="{BB962C8B-B14F-4D97-AF65-F5344CB8AC3E}">
-        <p14:creationId xmlns:p14="http://schemas.microsoft.com/office/powerpoint/2010/main" val="1729044897"/>
+        <p14:creationId xmlns:p14="http://schemas.microsoft.com/office/powerpoint/2010/main" val="2370039527"/>
       </p:ext>
     </p:extLst>
   </p:cSld>
@@ -853,15 +853,15 @@
         </p:nvSpPr>
         <p:spPr>
           <a:xfrm>
-            <a:off x="1458988" y="7547788"/>
-            <a:ext cx="18443377" cy="12593645"/>
+            <a:off x="1471227" y="7592510"/>
+            <a:ext cx="18598099" cy="12668265"/>
           </a:xfrm>
         </p:spPr>
         <p:txBody>
           <a:bodyPr anchor="b"/>
           <a:lstStyle>
             <a:lvl1pPr>
-              <a:defRPr sz="14031"/>
+              <a:defRPr sz="14149"/>
             </a:lvl1pPr>
           </a:lstStyle>
           <a:p>
@@ -885,8 +885,8 @@
         </p:nvSpPr>
         <p:spPr>
           <a:xfrm>
-            <a:off x="1458988" y="20260574"/>
-            <a:ext cx="18443377" cy="6622701"/>
+            <a:off x="1471227" y="20380622"/>
+            <a:ext cx="18598099" cy="6661942"/>
           </a:xfrm>
         </p:spPr>
         <p:txBody>
@@ -894,15 +894,15 @@
           <a:lstStyle>
             <a:lvl1pPr marL="0" indent="0">
               <a:buNone/>
-              <a:defRPr sz="5612">
+              <a:defRPr sz="5660">
                 <a:solidFill>
                   <a:schemeClr val="tx1"/>
                 </a:solidFill>
               </a:defRPr>
             </a:lvl1pPr>
-            <a:lvl2pPr marL="1069162" indent="0">
-              <a:buNone/>
-              <a:defRPr sz="4677">
+            <a:lvl2pPr marL="1078169" indent="0">
+              <a:buNone/>
+              <a:defRPr sz="4716">
                 <a:solidFill>
                   <a:schemeClr val="tx1">
                     <a:tint val="75000"/>
@@ -910,9 +910,9 @@
                 </a:solidFill>
               </a:defRPr>
             </a:lvl2pPr>
-            <a:lvl3pPr marL="2138324" indent="0">
-              <a:buNone/>
-              <a:defRPr sz="4209">
+            <a:lvl3pPr marL="2156338" indent="0">
+              <a:buNone/>
+              <a:defRPr sz="4245">
                 <a:solidFill>
                   <a:schemeClr val="tx1">
                     <a:tint val="75000"/>
@@ -920,9 +920,9 @@
                 </a:solidFill>
               </a:defRPr>
             </a:lvl3pPr>
-            <a:lvl4pPr marL="3207487" indent="0">
-              <a:buNone/>
-              <a:defRPr sz="3742">
+            <a:lvl4pPr marL="3234507" indent="0">
+              <a:buNone/>
+              <a:defRPr sz="3773">
                 <a:solidFill>
                   <a:schemeClr val="tx1">
                     <a:tint val="75000"/>
@@ -930,9 +930,9 @@
                 </a:solidFill>
               </a:defRPr>
             </a:lvl4pPr>
-            <a:lvl5pPr marL="4276649" indent="0">
-              <a:buNone/>
-              <a:defRPr sz="3742">
+            <a:lvl5pPr marL="4312676" indent="0">
+              <a:buNone/>
+              <a:defRPr sz="3773">
                 <a:solidFill>
                   <a:schemeClr val="tx1">
                     <a:tint val="75000"/>
@@ -940,9 +940,9 @@
                 </a:solidFill>
               </a:defRPr>
             </a:lvl5pPr>
-            <a:lvl6pPr marL="5345811" indent="0">
-              <a:buNone/>
-              <a:defRPr sz="3742">
+            <a:lvl6pPr marL="5390845" indent="0">
+              <a:buNone/>
+              <a:defRPr sz="3773">
                 <a:solidFill>
                   <a:schemeClr val="tx1">
                     <a:tint val="75000"/>
@@ -950,9 +950,9 @@
                 </a:solidFill>
               </a:defRPr>
             </a:lvl6pPr>
-            <a:lvl7pPr marL="6414973" indent="0">
-              <a:buNone/>
-              <a:defRPr sz="3742">
+            <a:lvl7pPr marL="6469014" indent="0">
+              <a:buNone/>
+              <a:defRPr sz="3773">
                 <a:solidFill>
                   <a:schemeClr val="tx1">
                     <a:tint val="75000"/>
@@ -960,9 +960,9 @@
                 </a:solidFill>
               </a:defRPr>
             </a:lvl7pPr>
-            <a:lvl8pPr marL="7484135" indent="0">
-              <a:buNone/>
-              <a:defRPr sz="3742">
+            <a:lvl8pPr marL="7547183" indent="0">
+              <a:buNone/>
+              <a:defRPr sz="3773">
                 <a:solidFill>
                   <a:schemeClr val="tx1">
                     <a:tint val="75000"/>
@@ -970,9 +970,9 @@
                 </a:solidFill>
               </a:defRPr>
             </a:lvl8pPr>
-            <a:lvl9pPr marL="8553298" indent="0">
-              <a:buNone/>
-              <a:defRPr sz="3742">
+            <a:lvl9pPr marL="8625352" indent="0">
+              <a:buNone/>
+              <a:defRPr sz="3773">
                 <a:solidFill>
                   <a:schemeClr val="tx1">
                     <a:tint val="75000"/>
@@ -1007,7 +1007,7 @@
           <a:p>
             <a:fld id="{3463DB28-6E68-436C-B067-02619AAB958B}" type="datetimeFigureOut">
               <a:rPr lang="en-AU" smtClean="0"/>
-              <a:t>19/06/2020</a:t>
+              <a:t>30/06/2020</a:t>
             </a:fld>
             <a:endParaRPr lang="en-AU"/>
           </a:p>
@@ -1058,7 +1058,7 @@
     </p:spTree>
     <p:extLst>
       <p:ext uri="{BB962C8B-B14F-4D97-AF65-F5344CB8AC3E}">
-        <p14:creationId xmlns:p14="http://schemas.microsoft.com/office/powerpoint/2010/main" val="3671447826"/>
+        <p14:creationId xmlns:p14="http://schemas.microsoft.com/office/powerpoint/2010/main" val="2997243510"/>
       </p:ext>
     </p:extLst>
   </p:cSld>
@@ -1120,8 +1120,8 @@
         </p:nvSpPr>
         <p:spPr>
           <a:xfrm>
-            <a:off x="1470124" y="8059374"/>
-            <a:ext cx="9088041" cy="19209345"/>
+            <a:off x="1482457" y="8107127"/>
+            <a:ext cx="9164281" cy="19323164"/>
           </a:xfrm>
         </p:spPr>
         <p:txBody>
@@ -1177,8 +1177,8 @@
         </p:nvSpPr>
         <p:spPr>
           <a:xfrm>
-            <a:off x="10825460" y="8059374"/>
-            <a:ext cx="9088041" cy="19209345"/>
+            <a:off x="10916275" y="8107127"/>
+            <a:ext cx="9164281" cy="19323164"/>
           </a:xfrm>
         </p:spPr>
         <p:txBody>
@@ -1239,7 +1239,7 @@
           <a:p>
             <a:fld id="{3463DB28-6E68-436C-B067-02619AAB958B}" type="datetimeFigureOut">
               <a:rPr lang="en-AU" smtClean="0"/>
-              <a:t>19/06/2020</a:t>
+              <a:t>30/06/2020</a:t>
             </a:fld>
             <a:endParaRPr lang="en-AU"/>
           </a:p>
@@ -1290,7 +1290,7 @@
     </p:spTree>
     <p:extLst>
       <p:ext uri="{BB962C8B-B14F-4D97-AF65-F5344CB8AC3E}">
-        <p14:creationId xmlns:p14="http://schemas.microsoft.com/office/powerpoint/2010/main" val="2492877650"/>
+        <p14:creationId xmlns:p14="http://schemas.microsoft.com/office/powerpoint/2010/main" val="3363988337"/>
       </p:ext>
     </p:extLst>
   </p:cSld>
@@ -1329,8 +1329,8 @@
         </p:nvSpPr>
         <p:spPr>
           <a:xfrm>
-            <a:off x="1472909" y="1611882"/>
-            <a:ext cx="18443377" cy="5851808"/>
+            <a:off x="1485266" y="1621432"/>
+            <a:ext cx="18598099" cy="5886482"/>
           </a:xfrm>
         </p:spPr>
         <p:txBody>
@@ -1357,8 +1357,8 @@
         </p:nvSpPr>
         <p:spPr>
           <a:xfrm>
-            <a:off x="1472912" y="7421634"/>
-            <a:ext cx="9046274" cy="3637228"/>
+            <a:off x="1485268" y="7465609"/>
+            <a:ext cx="9122164" cy="3658780"/>
           </a:xfrm>
         </p:spPr>
         <p:txBody>
@@ -1366,39 +1366,39 @@
           <a:lstStyle>
             <a:lvl1pPr marL="0" indent="0">
               <a:buNone/>
-              <a:defRPr sz="5612" b="1"/>
+              <a:defRPr sz="5660" b="1"/>
             </a:lvl1pPr>
-            <a:lvl2pPr marL="1069162" indent="0">
-              <a:buNone/>
-              <a:defRPr sz="4677" b="1"/>
+            <a:lvl2pPr marL="1078169" indent="0">
+              <a:buNone/>
+              <a:defRPr sz="4716" b="1"/>
             </a:lvl2pPr>
-            <a:lvl3pPr marL="2138324" indent="0">
-              <a:buNone/>
-              <a:defRPr sz="4209" b="1"/>
+            <a:lvl3pPr marL="2156338" indent="0">
+              <a:buNone/>
+              <a:defRPr sz="4245" b="1"/>
             </a:lvl3pPr>
-            <a:lvl4pPr marL="3207487" indent="0">
-              <a:buNone/>
-              <a:defRPr sz="3742" b="1"/>
+            <a:lvl4pPr marL="3234507" indent="0">
+              <a:buNone/>
+              <a:defRPr sz="3773" b="1"/>
             </a:lvl4pPr>
-            <a:lvl5pPr marL="4276649" indent="0">
-              <a:buNone/>
-              <a:defRPr sz="3742" b="1"/>
+            <a:lvl5pPr marL="4312676" indent="0">
+              <a:buNone/>
+              <a:defRPr sz="3773" b="1"/>
             </a:lvl5pPr>
-            <a:lvl6pPr marL="5345811" indent="0">
-              <a:buNone/>
-              <a:defRPr sz="3742" b="1"/>
+            <a:lvl6pPr marL="5390845" indent="0">
+              <a:buNone/>
+              <a:defRPr sz="3773" b="1"/>
             </a:lvl6pPr>
-            <a:lvl7pPr marL="6414973" indent="0">
-              <a:buNone/>
-              <a:defRPr sz="3742" b="1"/>
+            <a:lvl7pPr marL="6469014" indent="0">
+              <a:buNone/>
+              <a:defRPr sz="3773" b="1"/>
             </a:lvl7pPr>
-            <a:lvl8pPr marL="7484135" indent="0">
-              <a:buNone/>
-              <a:defRPr sz="3742" b="1"/>
+            <a:lvl8pPr marL="7547183" indent="0">
+              <a:buNone/>
+              <a:defRPr sz="3773" b="1"/>
             </a:lvl8pPr>
-            <a:lvl9pPr marL="8553298" indent="0">
-              <a:buNone/>
-              <a:defRPr sz="3742" b="1"/>
+            <a:lvl9pPr marL="8625352" indent="0">
+              <a:buNone/>
+              <a:defRPr sz="3773" b="1"/>
             </a:lvl9pPr>
           </a:lstStyle>
           <a:p>
@@ -1422,8 +1422,8 @@
         </p:nvSpPr>
         <p:spPr>
           <a:xfrm>
-            <a:off x="1472912" y="11058863"/>
-            <a:ext cx="9046274" cy="16265921"/>
+            <a:off x="1485268" y="11124389"/>
+            <a:ext cx="9122164" cy="16362300"/>
           </a:xfrm>
         </p:spPr>
         <p:txBody>
@@ -1479,8 +1479,8 @@
         </p:nvSpPr>
         <p:spPr>
           <a:xfrm>
-            <a:off x="10825461" y="7421634"/>
-            <a:ext cx="9090826" cy="3637228"/>
+            <a:off x="10916277" y="7465609"/>
+            <a:ext cx="9167089" cy="3658780"/>
           </a:xfrm>
         </p:spPr>
         <p:txBody>
@@ -1488,39 +1488,39 @@
           <a:lstStyle>
             <a:lvl1pPr marL="0" indent="0">
               <a:buNone/>
-              <a:defRPr sz="5612" b="1"/>
+              <a:defRPr sz="5660" b="1"/>
             </a:lvl1pPr>
-            <a:lvl2pPr marL="1069162" indent="0">
-              <a:buNone/>
-              <a:defRPr sz="4677" b="1"/>
+            <a:lvl2pPr marL="1078169" indent="0">
+              <a:buNone/>
+              <a:defRPr sz="4716" b="1"/>
             </a:lvl2pPr>
-            <a:lvl3pPr marL="2138324" indent="0">
-              <a:buNone/>
-              <a:defRPr sz="4209" b="1"/>
+            <a:lvl3pPr marL="2156338" indent="0">
+              <a:buNone/>
+              <a:defRPr sz="4245" b="1"/>
             </a:lvl3pPr>
-            <a:lvl4pPr marL="3207487" indent="0">
-              <a:buNone/>
-              <a:defRPr sz="3742" b="1"/>
+            <a:lvl4pPr marL="3234507" indent="0">
+              <a:buNone/>
+              <a:defRPr sz="3773" b="1"/>
             </a:lvl4pPr>
-            <a:lvl5pPr marL="4276649" indent="0">
-              <a:buNone/>
-              <a:defRPr sz="3742" b="1"/>
+            <a:lvl5pPr marL="4312676" indent="0">
+              <a:buNone/>
+              <a:defRPr sz="3773" b="1"/>
             </a:lvl5pPr>
-            <a:lvl6pPr marL="5345811" indent="0">
-              <a:buNone/>
-              <a:defRPr sz="3742" b="1"/>
+            <a:lvl6pPr marL="5390845" indent="0">
+              <a:buNone/>
+              <a:defRPr sz="3773" b="1"/>
             </a:lvl6pPr>
-            <a:lvl7pPr marL="6414973" indent="0">
-              <a:buNone/>
-              <a:defRPr sz="3742" b="1"/>
+            <a:lvl7pPr marL="6469014" indent="0">
+              <a:buNone/>
+              <a:defRPr sz="3773" b="1"/>
             </a:lvl7pPr>
-            <a:lvl8pPr marL="7484135" indent="0">
-              <a:buNone/>
-              <a:defRPr sz="3742" b="1"/>
+            <a:lvl8pPr marL="7547183" indent="0">
+              <a:buNone/>
+              <a:defRPr sz="3773" b="1"/>
             </a:lvl8pPr>
-            <a:lvl9pPr marL="8553298" indent="0">
-              <a:buNone/>
-              <a:defRPr sz="3742" b="1"/>
+            <a:lvl9pPr marL="8625352" indent="0">
+              <a:buNone/>
+              <a:defRPr sz="3773" b="1"/>
             </a:lvl9pPr>
           </a:lstStyle>
           <a:p>
@@ -1544,8 +1544,8 @@
         </p:nvSpPr>
         <p:spPr>
           <a:xfrm>
-            <a:off x="10825461" y="11058863"/>
-            <a:ext cx="9090826" cy="16265921"/>
+            <a:off x="10916277" y="11124389"/>
+            <a:ext cx="9167089" cy="16362300"/>
           </a:xfrm>
         </p:spPr>
         <p:txBody>
@@ -1606,7 +1606,7 @@
           <a:p>
             <a:fld id="{3463DB28-6E68-436C-B067-02619AAB958B}" type="datetimeFigureOut">
               <a:rPr lang="en-AU" smtClean="0"/>
-              <a:t>19/06/2020</a:t>
+              <a:t>30/06/2020</a:t>
             </a:fld>
             <a:endParaRPr lang="en-AU"/>
           </a:p>
@@ -1657,7 +1657,7 @@
     </p:spTree>
     <p:extLst>
       <p:ext uri="{BB962C8B-B14F-4D97-AF65-F5344CB8AC3E}">
-        <p14:creationId xmlns:p14="http://schemas.microsoft.com/office/powerpoint/2010/main" val="2971116465"/>
+        <p14:creationId xmlns:p14="http://schemas.microsoft.com/office/powerpoint/2010/main" val="726746445"/>
       </p:ext>
     </p:extLst>
   </p:cSld>
@@ -1724,7 +1724,7 @@
           <a:p>
             <a:fld id="{3463DB28-6E68-436C-B067-02619AAB958B}" type="datetimeFigureOut">
               <a:rPr lang="en-AU" smtClean="0"/>
-              <a:t>19/06/2020</a:t>
+              <a:t>30/06/2020</a:t>
             </a:fld>
             <a:endParaRPr lang="en-AU"/>
           </a:p>
@@ -1775,7 +1775,7 @@
     </p:spTree>
     <p:extLst>
       <p:ext uri="{BB962C8B-B14F-4D97-AF65-F5344CB8AC3E}">
-        <p14:creationId xmlns:p14="http://schemas.microsoft.com/office/powerpoint/2010/main" val="2949925917"/>
+        <p14:creationId xmlns:p14="http://schemas.microsoft.com/office/powerpoint/2010/main" val="408223008"/>
       </p:ext>
     </p:extLst>
   </p:cSld>
@@ -1819,7 +1819,7 @@
           <a:p>
             <a:fld id="{3463DB28-6E68-436C-B067-02619AAB958B}" type="datetimeFigureOut">
               <a:rPr lang="en-AU" smtClean="0"/>
-              <a:t>19/06/2020</a:t>
+              <a:t>30/06/2020</a:t>
             </a:fld>
             <a:endParaRPr lang="en-AU"/>
           </a:p>
@@ -1870,7 +1870,7 @@
     </p:spTree>
     <p:extLst>
       <p:ext uri="{BB962C8B-B14F-4D97-AF65-F5344CB8AC3E}">
-        <p14:creationId xmlns:p14="http://schemas.microsoft.com/office/powerpoint/2010/main" val="837611778"/>
+        <p14:creationId xmlns:p14="http://schemas.microsoft.com/office/powerpoint/2010/main" val="2302772565"/>
       </p:ext>
     </p:extLst>
   </p:cSld>
@@ -1909,15 +1909,15 @@
         </p:nvSpPr>
         <p:spPr>
           <a:xfrm>
-            <a:off x="1472909" y="2018348"/>
-            <a:ext cx="6896776" cy="7064216"/>
+            <a:off x="1485266" y="2030307"/>
+            <a:ext cx="6954633" cy="7106073"/>
           </a:xfrm>
         </p:spPr>
         <p:txBody>
           <a:bodyPr anchor="b"/>
           <a:lstStyle>
             <a:lvl1pPr>
-              <a:defRPr sz="7483"/>
+              <a:defRPr sz="7546"/>
             </a:lvl1pPr>
           </a:lstStyle>
           <a:p>
@@ -1941,39 +1941,39 @@
         </p:nvSpPr>
         <p:spPr>
           <a:xfrm>
-            <a:off x="9090826" y="4359077"/>
-            <a:ext cx="10825460" cy="21515024"/>
+            <a:off x="9167089" y="4384905"/>
+            <a:ext cx="10916275" cy="21642505"/>
           </a:xfrm>
         </p:spPr>
         <p:txBody>
           <a:bodyPr/>
           <a:lstStyle>
             <a:lvl1pPr>
-              <a:defRPr sz="7483"/>
+              <a:defRPr sz="7546"/>
             </a:lvl1pPr>
             <a:lvl2pPr>
-              <a:defRPr sz="6548"/>
+              <a:defRPr sz="6603"/>
             </a:lvl2pPr>
             <a:lvl3pPr>
-              <a:defRPr sz="5612"/>
+              <a:defRPr sz="5660"/>
             </a:lvl3pPr>
             <a:lvl4pPr>
-              <a:defRPr sz="4677"/>
+              <a:defRPr sz="4716"/>
             </a:lvl4pPr>
             <a:lvl5pPr>
-              <a:defRPr sz="4677"/>
+              <a:defRPr sz="4716"/>
             </a:lvl5pPr>
             <a:lvl6pPr>
-              <a:defRPr sz="4677"/>
+              <a:defRPr sz="4716"/>
             </a:lvl6pPr>
             <a:lvl7pPr>
-              <a:defRPr sz="4677"/>
+              <a:defRPr sz="4716"/>
             </a:lvl7pPr>
             <a:lvl8pPr>
-              <a:defRPr sz="4677"/>
+              <a:defRPr sz="4716"/>
             </a:lvl8pPr>
             <a:lvl9pPr>
-              <a:defRPr sz="4677"/>
+              <a:defRPr sz="4716"/>
             </a:lvl9pPr>
           </a:lstStyle>
           <a:p>
@@ -2026,8 +2026,8 @@
         </p:nvSpPr>
         <p:spPr>
           <a:xfrm>
-            <a:off x="1472909" y="9082564"/>
-            <a:ext cx="6896776" cy="16826573"/>
+            <a:off x="1485266" y="9136380"/>
+            <a:ext cx="6954633" cy="16926274"/>
           </a:xfrm>
         </p:spPr>
         <p:txBody>
@@ -2035,39 +2035,39 @@
           <a:lstStyle>
             <a:lvl1pPr marL="0" indent="0">
               <a:buNone/>
-              <a:defRPr sz="3742"/>
+              <a:defRPr sz="3773"/>
             </a:lvl1pPr>
-            <a:lvl2pPr marL="1069162" indent="0">
-              <a:buNone/>
-              <a:defRPr sz="3274"/>
+            <a:lvl2pPr marL="1078169" indent="0">
+              <a:buNone/>
+              <a:defRPr sz="3301"/>
             </a:lvl2pPr>
-            <a:lvl3pPr marL="2138324" indent="0">
-              <a:buNone/>
-              <a:defRPr sz="2806"/>
+            <a:lvl3pPr marL="2156338" indent="0">
+              <a:buNone/>
+              <a:defRPr sz="2830"/>
             </a:lvl3pPr>
-            <a:lvl4pPr marL="3207487" indent="0">
-              <a:buNone/>
-              <a:defRPr sz="2339"/>
+            <a:lvl4pPr marL="3234507" indent="0">
+              <a:buNone/>
+              <a:defRPr sz="2358"/>
             </a:lvl4pPr>
-            <a:lvl5pPr marL="4276649" indent="0">
-              <a:buNone/>
-              <a:defRPr sz="2339"/>
+            <a:lvl5pPr marL="4312676" indent="0">
+              <a:buNone/>
+              <a:defRPr sz="2358"/>
             </a:lvl5pPr>
-            <a:lvl6pPr marL="5345811" indent="0">
-              <a:buNone/>
-              <a:defRPr sz="2339"/>
+            <a:lvl6pPr marL="5390845" indent="0">
+              <a:buNone/>
+              <a:defRPr sz="2358"/>
             </a:lvl6pPr>
-            <a:lvl7pPr marL="6414973" indent="0">
-              <a:buNone/>
-              <a:defRPr sz="2339"/>
+            <a:lvl7pPr marL="6469014" indent="0">
+              <a:buNone/>
+              <a:defRPr sz="2358"/>
             </a:lvl7pPr>
-            <a:lvl8pPr marL="7484135" indent="0">
-              <a:buNone/>
-              <a:defRPr sz="2339"/>
+            <a:lvl8pPr marL="7547183" indent="0">
+              <a:buNone/>
+              <a:defRPr sz="2358"/>
             </a:lvl8pPr>
-            <a:lvl9pPr marL="8553298" indent="0">
-              <a:buNone/>
-              <a:defRPr sz="2339"/>
+            <a:lvl9pPr marL="8625352" indent="0">
+              <a:buNone/>
+              <a:defRPr sz="2358"/>
             </a:lvl9pPr>
           </a:lstStyle>
           <a:p>
@@ -2096,7 +2096,7 @@
           <a:p>
             <a:fld id="{3463DB28-6E68-436C-B067-02619AAB958B}" type="datetimeFigureOut">
               <a:rPr lang="en-AU" smtClean="0"/>
-              <a:t>19/06/2020</a:t>
+              <a:t>30/06/2020</a:t>
             </a:fld>
             <a:endParaRPr lang="en-AU"/>
           </a:p>
@@ -2147,7 +2147,7 @@
     </p:spTree>
     <p:extLst>
       <p:ext uri="{BB962C8B-B14F-4D97-AF65-F5344CB8AC3E}">
-        <p14:creationId xmlns:p14="http://schemas.microsoft.com/office/powerpoint/2010/main" val="2820615570"/>
+        <p14:creationId xmlns:p14="http://schemas.microsoft.com/office/powerpoint/2010/main" val="3952857434"/>
       </p:ext>
     </p:extLst>
   </p:cSld>
@@ -2186,15 +2186,15 @@
         </p:nvSpPr>
         <p:spPr>
           <a:xfrm>
-            <a:off x="1472909" y="2018348"/>
-            <a:ext cx="6896776" cy="7064216"/>
+            <a:off x="1485266" y="2030307"/>
+            <a:ext cx="6954633" cy="7106073"/>
           </a:xfrm>
         </p:spPr>
         <p:txBody>
           <a:bodyPr anchor="b"/>
           <a:lstStyle>
             <a:lvl1pPr>
-              <a:defRPr sz="7483"/>
+              <a:defRPr sz="7546"/>
             </a:lvl1pPr>
           </a:lstStyle>
           <a:p>
@@ -2218,8 +2218,8 @@
         </p:nvSpPr>
         <p:spPr>
           <a:xfrm>
-            <a:off x="9090826" y="4359077"/>
-            <a:ext cx="10825460" cy="21515024"/>
+            <a:off x="9167089" y="4384905"/>
+            <a:ext cx="10916275" cy="21642505"/>
           </a:xfrm>
         </p:spPr>
         <p:txBody>
@@ -2227,39 +2227,39 @@
           <a:lstStyle>
             <a:lvl1pPr marL="0" indent="0">
               <a:buNone/>
-              <a:defRPr sz="7483"/>
+              <a:defRPr sz="7546"/>
             </a:lvl1pPr>
-            <a:lvl2pPr marL="1069162" indent="0">
-              <a:buNone/>
-              <a:defRPr sz="6548"/>
+            <a:lvl2pPr marL="1078169" indent="0">
+              <a:buNone/>
+              <a:defRPr sz="6603"/>
             </a:lvl2pPr>
-            <a:lvl3pPr marL="2138324" indent="0">
-              <a:buNone/>
-              <a:defRPr sz="5612"/>
+            <a:lvl3pPr marL="2156338" indent="0">
+              <a:buNone/>
+              <a:defRPr sz="5660"/>
             </a:lvl3pPr>
-            <a:lvl4pPr marL="3207487" indent="0">
-              <a:buNone/>
-              <a:defRPr sz="4677"/>
+            <a:lvl4pPr marL="3234507" indent="0">
+              <a:buNone/>
+              <a:defRPr sz="4716"/>
             </a:lvl4pPr>
-            <a:lvl5pPr marL="4276649" indent="0">
-              <a:buNone/>
-              <a:defRPr sz="4677"/>
+            <a:lvl5pPr marL="4312676" indent="0">
+              <a:buNone/>
+              <a:defRPr sz="4716"/>
             </a:lvl5pPr>
-            <a:lvl6pPr marL="5345811" indent="0">
-              <a:buNone/>
-              <a:defRPr sz="4677"/>
+            <a:lvl6pPr marL="5390845" indent="0">
+              <a:buNone/>
+              <a:defRPr sz="4716"/>
             </a:lvl6pPr>
-            <a:lvl7pPr marL="6414973" indent="0">
-              <a:buNone/>
-              <a:defRPr sz="4677"/>
+            <a:lvl7pPr marL="6469014" indent="0">
+              <a:buNone/>
+              <a:defRPr sz="4716"/>
             </a:lvl7pPr>
-            <a:lvl8pPr marL="7484135" indent="0">
-              <a:buNone/>
-              <a:defRPr sz="4677"/>
+            <a:lvl8pPr marL="7547183" indent="0">
+              <a:buNone/>
+              <a:defRPr sz="4716"/>
             </a:lvl8pPr>
-            <a:lvl9pPr marL="8553298" indent="0">
-              <a:buNone/>
-              <a:defRPr sz="4677"/>
+            <a:lvl9pPr marL="8625352" indent="0">
+              <a:buNone/>
+              <a:defRPr sz="4716"/>
             </a:lvl9pPr>
           </a:lstStyle>
           <a:p>
@@ -2283,8 +2283,8 @@
         </p:nvSpPr>
         <p:spPr>
           <a:xfrm>
-            <a:off x="1472909" y="9082564"/>
-            <a:ext cx="6896776" cy="16826573"/>
+            <a:off x="1485266" y="9136380"/>
+            <a:ext cx="6954633" cy="16926274"/>
           </a:xfrm>
         </p:spPr>
         <p:txBody>
@@ -2292,39 +2292,39 @@
           <a:lstStyle>
             <a:lvl1pPr marL="0" indent="0">
               <a:buNone/>
-              <a:defRPr sz="3742"/>
+              <a:defRPr sz="3773"/>
             </a:lvl1pPr>
-            <a:lvl2pPr marL="1069162" indent="0">
-              <a:buNone/>
-              <a:defRPr sz="3274"/>
+            <a:lvl2pPr marL="1078169" indent="0">
+              <a:buNone/>
+              <a:defRPr sz="3301"/>
             </a:lvl2pPr>
-            <a:lvl3pPr marL="2138324" indent="0">
-              <a:buNone/>
-              <a:defRPr sz="2806"/>
+            <a:lvl3pPr marL="2156338" indent="0">
+              <a:buNone/>
+              <a:defRPr sz="2830"/>
             </a:lvl3pPr>
-            <a:lvl4pPr marL="3207487" indent="0">
-              <a:buNone/>
-              <a:defRPr sz="2339"/>
+            <a:lvl4pPr marL="3234507" indent="0">
+              <a:buNone/>
+              <a:defRPr sz="2358"/>
             </a:lvl4pPr>
-            <a:lvl5pPr marL="4276649" indent="0">
-              <a:buNone/>
-              <a:defRPr sz="2339"/>
+            <a:lvl5pPr marL="4312676" indent="0">
+              <a:buNone/>
+              <a:defRPr sz="2358"/>
             </a:lvl5pPr>
-            <a:lvl6pPr marL="5345811" indent="0">
-              <a:buNone/>
-              <a:defRPr sz="2339"/>
+            <a:lvl6pPr marL="5390845" indent="0">
+              <a:buNone/>
+              <a:defRPr sz="2358"/>
             </a:lvl6pPr>
-            <a:lvl7pPr marL="6414973" indent="0">
-              <a:buNone/>
-              <a:defRPr sz="2339"/>
+            <a:lvl7pPr marL="6469014" indent="0">
+              <a:buNone/>
+              <a:defRPr sz="2358"/>
             </a:lvl7pPr>
-            <a:lvl8pPr marL="7484135" indent="0">
-              <a:buNone/>
-              <a:defRPr sz="2339"/>
+            <a:lvl8pPr marL="7547183" indent="0">
+              <a:buNone/>
+              <a:defRPr sz="2358"/>
             </a:lvl8pPr>
-            <a:lvl9pPr marL="8553298" indent="0">
-              <a:buNone/>
-              <a:defRPr sz="2339"/>
+            <a:lvl9pPr marL="8625352" indent="0">
+              <a:buNone/>
+              <a:defRPr sz="2358"/>
             </a:lvl9pPr>
           </a:lstStyle>
           <a:p>
@@ -2353,7 +2353,7 @@
           <a:p>
             <a:fld id="{3463DB28-6E68-436C-B067-02619AAB958B}" type="datetimeFigureOut">
               <a:rPr lang="en-AU" smtClean="0"/>
-              <a:t>19/06/2020</a:t>
+              <a:t>30/06/2020</a:t>
             </a:fld>
             <a:endParaRPr lang="en-AU"/>
           </a:p>
@@ -2404,7 +2404,7 @@
     </p:spTree>
     <p:extLst>
       <p:ext uri="{BB962C8B-B14F-4D97-AF65-F5344CB8AC3E}">
-        <p14:creationId xmlns:p14="http://schemas.microsoft.com/office/powerpoint/2010/main" val="4064216274"/>
+        <p14:creationId xmlns:p14="http://schemas.microsoft.com/office/powerpoint/2010/main" val="3683660352"/>
       </p:ext>
     </p:extLst>
   </p:cSld>
@@ -2448,8 +2448,8 @@
         </p:nvSpPr>
         <p:spPr>
           <a:xfrm>
-            <a:off x="1470124" y="1611882"/>
-            <a:ext cx="18443377" cy="5851808"/>
+            <a:off x="1482457" y="1621432"/>
+            <a:ext cx="18598099" cy="5886482"/>
           </a:xfrm>
           <a:prstGeom prst="rect">
             <a:avLst/>
@@ -2481,8 +2481,8 @@
         </p:nvSpPr>
         <p:spPr>
           <a:xfrm>
-            <a:off x="1470124" y="8059374"/>
-            <a:ext cx="18443377" cy="19209345"/>
+            <a:off x="1482457" y="8107127"/>
+            <a:ext cx="18598099" cy="19323164"/>
           </a:xfrm>
           <a:prstGeom prst="rect">
             <a:avLst/>
@@ -2543,8 +2543,8 @@
         </p:nvSpPr>
         <p:spPr>
           <a:xfrm>
-            <a:off x="1470124" y="28060644"/>
-            <a:ext cx="4811316" cy="1611875"/>
+            <a:off x="1482457" y="28226909"/>
+            <a:ext cx="4851678" cy="1621425"/>
           </a:xfrm>
           <a:prstGeom prst="rect">
             <a:avLst/>
@@ -2554,7 +2554,7 @@
           <a:bodyPr vert="horz" lIns="91440" tIns="45720" rIns="91440" bIns="45720" rtlCol="0" anchor="ctr"/>
           <a:lstStyle>
             <a:lvl1pPr algn="l">
-              <a:defRPr sz="2806">
+              <a:defRPr sz="2830">
                 <a:solidFill>
                   <a:schemeClr val="tx1">
                     <a:tint val="75000"/>
@@ -2566,7 +2566,7 @@
           <a:p>
             <a:fld id="{3463DB28-6E68-436C-B067-02619AAB958B}" type="datetimeFigureOut">
               <a:rPr lang="en-AU" smtClean="0"/>
-              <a:t>19/06/2020</a:t>
+              <a:t>30/06/2020</a:t>
             </a:fld>
             <a:endParaRPr lang="en-AU"/>
           </a:p>
@@ -2584,8 +2584,8 @@
         </p:nvSpPr>
         <p:spPr>
           <a:xfrm>
-            <a:off x="7083326" y="28060644"/>
-            <a:ext cx="7216973" cy="1611875"/>
+            <a:off x="7142748" y="28226909"/>
+            <a:ext cx="7277517" cy="1621425"/>
           </a:xfrm>
           <a:prstGeom prst="rect">
             <a:avLst/>
@@ -2595,7 +2595,7 @@
           <a:bodyPr vert="horz" lIns="91440" tIns="45720" rIns="91440" bIns="45720" rtlCol="0" anchor="ctr"/>
           <a:lstStyle>
             <a:lvl1pPr algn="ctr">
-              <a:defRPr sz="2806">
+              <a:defRPr sz="2830">
                 <a:solidFill>
                   <a:schemeClr val="tx1">
                     <a:tint val="75000"/>
@@ -2621,8 +2621,8 @@
         </p:nvSpPr>
         <p:spPr>
           <a:xfrm>
-            <a:off x="15102185" y="28060644"/>
-            <a:ext cx="4811316" cy="1611875"/>
+            <a:off x="15228878" y="28226909"/>
+            <a:ext cx="4851678" cy="1621425"/>
           </a:xfrm>
           <a:prstGeom prst="rect">
             <a:avLst/>
@@ -2632,7 +2632,7 @@
           <a:bodyPr vert="horz" lIns="91440" tIns="45720" rIns="91440" bIns="45720" rtlCol="0" anchor="ctr"/>
           <a:lstStyle>
             <a:lvl1pPr algn="r">
-              <a:defRPr sz="2806">
+              <a:defRPr sz="2830">
                 <a:solidFill>
                   <a:schemeClr val="tx1">
                     <a:tint val="75000"/>
@@ -2653,27 +2653,27 @@
     </p:spTree>
     <p:extLst>
       <p:ext uri="{BB962C8B-B14F-4D97-AF65-F5344CB8AC3E}">
-        <p14:creationId xmlns:p14="http://schemas.microsoft.com/office/powerpoint/2010/main" val="2407234654"/>
+        <p14:creationId xmlns:p14="http://schemas.microsoft.com/office/powerpoint/2010/main" val="3581753711"/>
       </p:ext>
     </p:extLst>
   </p:cSld>
   <p:clrMap bg1="lt1" tx1="dk1" bg2="lt2" tx2="dk2" accent1="accent1" accent2="accent2" accent3="accent3" accent4="accent4" accent5="accent5" accent6="accent6" hlink="hlink" folHlink="folHlink"/>
   <p:sldLayoutIdLst>
-    <p:sldLayoutId id="2147483661" r:id="rId1"/>
-    <p:sldLayoutId id="2147483662" r:id="rId2"/>
-    <p:sldLayoutId id="2147483663" r:id="rId3"/>
-    <p:sldLayoutId id="2147483664" r:id="rId4"/>
-    <p:sldLayoutId id="2147483665" r:id="rId5"/>
-    <p:sldLayoutId id="2147483666" r:id="rId6"/>
-    <p:sldLayoutId id="2147483667" r:id="rId7"/>
-    <p:sldLayoutId id="2147483668" r:id="rId8"/>
-    <p:sldLayoutId id="2147483669" r:id="rId9"/>
-    <p:sldLayoutId id="2147483670" r:id="rId10"/>
-    <p:sldLayoutId id="2147483671" r:id="rId11"/>
+    <p:sldLayoutId id="2147483673" r:id="rId1"/>
+    <p:sldLayoutId id="2147483674" r:id="rId2"/>
+    <p:sldLayoutId id="2147483675" r:id="rId3"/>
+    <p:sldLayoutId id="2147483676" r:id="rId4"/>
+    <p:sldLayoutId id="2147483677" r:id="rId5"/>
+    <p:sldLayoutId id="2147483678" r:id="rId6"/>
+    <p:sldLayoutId id="2147483679" r:id="rId7"/>
+    <p:sldLayoutId id="2147483680" r:id="rId8"/>
+    <p:sldLayoutId id="2147483681" r:id="rId9"/>
+    <p:sldLayoutId id="2147483682" r:id="rId10"/>
+    <p:sldLayoutId id="2147483683" r:id="rId11"/>
   </p:sldLayoutIdLst>
   <p:txStyles>
     <p:titleStyle>
-      <a:lvl1pPr algn="l" defTabSz="2138324" rtl="0" eaLnBrk="1" latinLnBrk="0" hangingPunct="1">
+      <a:lvl1pPr algn="l" defTabSz="2156338" rtl="0" eaLnBrk="1" latinLnBrk="0" hangingPunct="1">
         <a:lnSpc>
           <a:spcPct val="90000"/>
         </a:lnSpc>
@@ -2681,7 +2681,7 @@
           <a:spcPct val="0"/>
         </a:spcBef>
         <a:buNone/>
-        <a:defRPr sz="10289" kern="1200">
+        <a:defRPr sz="10376" kern="1200">
           <a:solidFill>
             <a:schemeClr val="tx1"/>
           </a:solidFill>
@@ -2692,16 +2692,16 @@
       </a:lvl1pPr>
     </p:titleStyle>
     <p:bodyStyle>
-      <a:lvl1pPr marL="534581" indent="-534581" algn="l" defTabSz="2138324" rtl="0" eaLnBrk="1" latinLnBrk="0" hangingPunct="1">
+      <a:lvl1pPr marL="539085" indent="-539085" algn="l" defTabSz="2156338" rtl="0" eaLnBrk="1" latinLnBrk="0" hangingPunct="1">
         <a:lnSpc>
           <a:spcPct val="90000"/>
         </a:lnSpc>
         <a:spcBef>
-          <a:spcPts val="2339"/>
+          <a:spcPts val="2358"/>
         </a:spcBef>
         <a:buFont typeface="Arial" panose="020B0604020202020204" pitchFamily="34" charset="0"/>
         <a:buChar char="•"/>
-        <a:defRPr sz="6548" kern="1200">
+        <a:defRPr sz="6603" kern="1200">
           <a:solidFill>
             <a:schemeClr val="tx1"/>
           </a:solidFill>
@@ -2710,16 +2710,16 @@
           <a:cs typeface="+mn-cs"/>
         </a:defRPr>
       </a:lvl1pPr>
-      <a:lvl2pPr marL="1603743" indent="-534581" algn="l" defTabSz="2138324" rtl="0" eaLnBrk="1" latinLnBrk="0" hangingPunct="1">
+      <a:lvl2pPr marL="1617254" indent="-539085" algn="l" defTabSz="2156338" rtl="0" eaLnBrk="1" latinLnBrk="0" hangingPunct="1">
         <a:lnSpc>
           <a:spcPct val="90000"/>
         </a:lnSpc>
         <a:spcBef>
-          <a:spcPts val="1169"/>
+          <a:spcPts val="1179"/>
         </a:spcBef>
         <a:buFont typeface="Arial" panose="020B0604020202020204" pitchFamily="34" charset="0"/>
         <a:buChar char="•"/>
-        <a:defRPr sz="5612" kern="1200">
+        <a:defRPr sz="5660" kern="1200">
           <a:solidFill>
             <a:schemeClr val="tx1"/>
           </a:solidFill>
@@ -2728,16 +2728,16 @@
           <a:cs typeface="+mn-cs"/>
         </a:defRPr>
       </a:lvl2pPr>
-      <a:lvl3pPr marL="2672906" indent="-534581" algn="l" defTabSz="2138324" rtl="0" eaLnBrk="1" latinLnBrk="0" hangingPunct="1">
+      <a:lvl3pPr marL="2695423" indent="-539085" algn="l" defTabSz="2156338" rtl="0" eaLnBrk="1" latinLnBrk="0" hangingPunct="1">
         <a:lnSpc>
           <a:spcPct val="90000"/>
         </a:lnSpc>
         <a:spcBef>
-          <a:spcPts val="1169"/>
+          <a:spcPts val="1179"/>
         </a:spcBef>
         <a:buFont typeface="Arial" panose="020B0604020202020204" pitchFamily="34" charset="0"/>
         <a:buChar char="•"/>
-        <a:defRPr sz="4677" kern="1200">
+        <a:defRPr sz="4716" kern="1200">
           <a:solidFill>
             <a:schemeClr val="tx1"/>
           </a:solidFill>
@@ -2746,16 +2746,16 @@
           <a:cs typeface="+mn-cs"/>
         </a:defRPr>
       </a:lvl3pPr>
-      <a:lvl4pPr marL="3742068" indent="-534581" algn="l" defTabSz="2138324" rtl="0" eaLnBrk="1" latinLnBrk="0" hangingPunct="1">
+      <a:lvl4pPr marL="3773592" indent="-539085" algn="l" defTabSz="2156338" rtl="0" eaLnBrk="1" latinLnBrk="0" hangingPunct="1">
         <a:lnSpc>
           <a:spcPct val="90000"/>
         </a:lnSpc>
         <a:spcBef>
-          <a:spcPts val="1169"/>
+          <a:spcPts val="1179"/>
         </a:spcBef>
         <a:buFont typeface="Arial" panose="020B0604020202020204" pitchFamily="34" charset="0"/>
         <a:buChar char="•"/>
-        <a:defRPr sz="4209" kern="1200">
+        <a:defRPr sz="4245" kern="1200">
           <a:solidFill>
             <a:schemeClr val="tx1"/>
           </a:solidFill>
@@ -2764,16 +2764,16 @@
           <a:cs typeface="+mn-cs"/>
         </a:defRPr>
       </a:lvl4pPr>
-      <a:lvl5pPr marL="4811230" indent="-534581" algn="l" defTabSz="2138324" rtl="0" eaLnBrk="1" latinLnBrk="0" hangingPunct="1">
+      <a:lvl5pPr marL="4851761" indent="-539085" algn="l" defTabSz="2156338" rtl="0" eaLnBrk="1" latinLnBrk="0" hangingPunct="1">
         <a:lnSpc>
           <a:spcPct val="90000"/>
         </a:lnSpc>
         <a:spcBef>
-          <a:spcPts val="1169"/>
+          <a:spcPts val="1179"/>
         </a:spcBef>
         <a:buFont typeface="Arial" panose="020B0604020202020204" pitchFamily="34" charset="0"/>
         <a:buChar char="•"/>
-        <a:defRPr sz="4209" kern="1200">
+        <a:defRPr sz="4245" kern="1200">
           <a:solidFill>
             <a:schemeClr val="tx1"/>
           </a:solidFill>
@@ -2782,16 +2782,16 @@
           <a:cs typeface="+mn-cs"/>
         </a:defRPr>
       </a:lvl5pPr>
-      <a:lvl6pPr marL="5880392" indent="-534581" algn="l" defTabSz="2138324" rtl="0" eaLnBrk="1" latinLnBrk="0" hangingPunct="1">
+      <a:lvl6pPr marL="5929930" indent="-539085" algn="l" defTabSz="2156338" rtl="0" eaLnBrk="1" latinLnBrk="0" hangingPunct="1">
         <a:lnSpc>
           <a:spcPct val="90000"/>
         </a:lnSpc>
         <a:spcBef>
-          <a:spcPts val="1169"/>
+          <a:spcPts val="1179"/>
         </a:spcBef>
         <a:buFont typeface="Arial" panose="020B0604020202020204" pitchFamily="34" charset="0"/>
         <a:buChar char="•"/>
-        <a:defRPr sz="4209" kern="1200">
+        <a:defRPr sz="4245" kern="1200">
           <a:solidFill>
             <a:schemeClr val="tx1"/>
           </a:solidFill>
@@ -2800,16 +2800,16 @@
           <a:cs typeface="+mn-cs"/>
         </a:defRPr>
       </a:lvl6pPr>
-      <a:lvl7pPr marL="6949554" indent="-534581" algn="l" defTabSz="2138324" rtl="0" eaLnBrk="1" latinLnBrk="0" hangingPunct="1">
+      <a:lvl7pPr marL="7008099" indent="-539085" algn="l" defTabSz="2156338" rtl="0" eaLnBrk="1" latinLnBrk="0" hangingPunct="1">
         <a:lnSpc>
           <a:spcPct val="90000"/>
         </a:lnSpc>
         <a:spcBef>
-          <a:spcPts val="1169"/>
+          <a:spcPts val="1179"/>
         </a:spcBef>
         <a:buFont typeface="Arial" panose="020B0604020202020204" pitchFamily="34" charset="0"/>
         <a:buChar char="•"/>
-        <a:defRPr sz="4209" kern="1200">
+        <a:defRPr sz="4245" kern="1200">
           <a:solidFill>
             <a:schemeClr val="tx1"/>
           </a:solidFill>
@@ -2818,16 +2818,16 @@
           <a:cs typeface="+mn-cs"/>
         </a:defRPr>
       </a:lvl7pPr>
-      <a:lvl8pPr marL="8018717" indent="-534581" algn="l" defTabSz="2138324" rtl="0" eaLnBrk="1" latinLnBrk="0" hangingPunct="1">
+      <a:lvl8pPr marL="8086268" indent="-539085" algn="l" defTabSz="2156338" rtl="0" eaLnBrk="1" latinLnBrk="0" hangingPunct="1">
         <a:lnSpc>
           <a:spcPct val="90000"/>
         </a:lnSpc>
         <a:spcBef>
-          <a:spcPts val="1169"/>
+          <a:spcPts val="1179"/>
         </a:spcBef>
         <a:buFont typeface="Arial" panose="020B0604020202020204" pitchFamily="34" charset="0"/>
         <a:buChar char="•"/>
-        <a:defRPr sz="4209" kern="1200">
+        <a:defRPr sz="4245" kern="1200">
           <a:solidFill>
             <a:schemeClr val="tx1"/>
           </a:solidFill>
@@ -2836,16 +2836,16 @@
           <a:cs typeface="+mn-cs"/>
         </a:defRPr>
       </a:lvl8pPr>
-      <a:lvl9pPr marL="9087879" indent="-534581" algn="l" defTabSz="2138324" rtl="0" eaLnBrk="1" latinLnBrk="0" hangingPunct="1">
+      <a:lvl9pPr marL="9164437" indent="-539085" algn="l" defTabSz="2156338" rtl="0" eaLnBrk="1" latinLnBrk="0" hangingPunct="1">
         <a:lnSpc>
           <a:spcPct val="90000"/>
         </a:lnSpc>
         <a:spcBef>
-          <a:spcPts val="1169"/>
+          <a:spcPts val="1179"/>
         </a:spcBef>
         <a:buFont typeface="Arial" panose="020B0604020202020204" pitchFamily="34" charset="0"/>
         <a:buChar char="•"/>
-        <a:defRPr sz="4209" kern="1200">
+        <a:defRPr sz="4245" kern="1200">
           <a:solidFill>
             <a:schemeClr val="tx1"/>
           </a:solidFill>
@@ -2859,8 +2859,8 @@
       <a:defPPr>
         <a:defRPr lang="en-US"/>
       </a:defPPr>
-      <a:lvl1pPr marL="0" algn="l" defTabSz="2138324" rtl="0" eaLnBrk="1" latinLnBrk="0" hangingPunct="1">
-        <a:defRPr sz="4209" kern="1200">
+      <a:lvl1pPr marL="0" algn="l" defTabSz="2156338" rtl="0" eaLnBrk="1" latinLnBrk="0" hangingPunct="1">
+        <a:defRPr sz="4245" kern="1200">
           <a:solidFill>
             <a:schemeClr val="tx1"/>
           </a:solidFill>
@@ -2869,8 +2869,8 @@
           <a:cs typeface="+mn-cs"/>
         </a:defRPr>
       </a:lvl1pPr>
-      <a:lvl2pPr marL="1069162" algn="l" defTabSz="2138324" rtl="0" eaLnBrk="1" latinLnBrk="0" hangingPunct="1">
-        <a:defRPr sz="4209" kern="1200">
+      <a:lvl2pPr marL="1078169" algn="l" defTabSz="2156338" rtl="0" eaLnBrk="1" latinLnBrk="0" hangingPunct="1">
+        <a:defRPr sz="4245" kern="1200">
           <a:solidFill>
             <a:schemeClr val="tx1"/>
           </a:solidFill>
@@ -2879,8 +2879,8 @@
           <a:cs typeface="+mn-cs"/>
         </a:defRPr>
       </a:lvl2pPr>
-      <a:lvl3pPr marL="2138324" algn="l" defTabSz="2138324" rtl="0" eaLnBrk="1" latinLnBrk="0" hangingPunct="1">
-        <a:defRPr sz="4209" kern="1200">
+      <a:lvl3pPr marL="2156338" algn="l" defTabSz="2156338" rtl="0" eaLnBrk="1" latinLnBrk="0" hangingPunct="1">
+        <a:defRPr sz="4245" kern="1200">
           <a:solidFill>
             <a:schemeClr val="tx1"/>
           </a:solidFill>
@@ -2889,8 +2889,8 @@
           <a:cs typeface="+mn-cs"/>
         </a:defRPr>
       </a:lvl3pPr>
-      <a:lvl4pPr marL="3207487" algn="l" defTabSz="2138324" rtl="0" eaLnBrk="1" latinLnBrk="0" hangingPunct="1">
-        <a:defRPr sz="4209" kern="1200">
+      <a:lvl4pPr marL="3234507" algn="l" defTabSz="2156338" rtl="0" eaLnBrk="1" latinLnBrk="0" hangingPunct="1">
+        <a:defRPr sz="4245" kern="1200">
           <a:solidFill>
             <a:schemeClr val="tx1"/>
           </a:solidFill>
@@ -2899,8 +2899,8 @@
           <a:cs typeface="+mn-cs"/>
         </a:defRPr>
       </a:lvl4pPr>
-      <a:lvl5pPr marL="4276649" algn="l" defTabSz="2138324" rtl="0" eaLnBrk="1" latinLnBrk="0" hangingPunct="1">
-        <a:defRPr sz="4209" kern="1200">
+      <a:lvl5pPr marL="4312676" algn="l" defTabSz="2156338" rtl="0" eaLnBrk="1" latinLnBrk="0" hangingPunct="1">
+        <a:defRPr sz="4245" kern="1200">
           <a:solidFill>
             <a:schemeClr val="tx1"/>
           </a:solidFill>
@@ -2909,8 +2909,8 @@
           <a:cs typeface="+mn-cs"/>
         </a:defRPr>
       </a:lvl5pPr>
-      <a:lvl6pPr marL="5345811" algn="l" defTabSz="2138324" rtl="0" eaLnBrk="1" latinLnBrk="0" hangingPunct="1">
-        <a:defRPr sz="4209" kern="1200">
+      <a:lvl6pPr marL="5390845" algn="l" defTabSz="2156338" rtl="0" eaLnBrk="1" latinLnBrk="0" hangingPunct="1">
+        <a:defRPr sz="4245" kern="1200">
           <a:solidFill>
             <a:schemeClr val="tx1"/>
           </a:solidFill>
@@ -2919,8 +2919,8 @@
           <a:cs typeface="+mn-cs"/>
         </a:defRPr>
       </a:lvl6pPr>
-      <a:lvl7pPr marL="6414973" algn="l" defTabSz="2138324" rtl="0" eaLnBrk="1" latinLnBrk="0" hangingPunct="1">
-        <a:defRPr sz="4209" kern="1200">
+      <a:lvl7pPr marL="6469014" algn="l" defTabSz="2156338" rtl="0" eaLnBrk="1" latinLnBrk="0" hangingPunct="1">
+        <a:defRPr sz="4245" kern="1200">
           <a:solidFill>
             <a:schemeClr val="tx1"/>
           </a:solidFill>
@@ -2929,8 +2929,8 @@
           <a:cs typeface="+mn-cs"/>
         </a:defRPr>
       </a:lvl7pPr>
-      <a:lvl8pPr marL="7484135" algn="l" defTabSz="2138324" rtl="0" eaLnBrk="1" latinLnBrk="0" hangingPunct="1">
-        <a:defRPr sz="4209" kern="1200">
+      <a:lvl8pPr marL="7547183" algn="l" defTabSz="2156338" rtl="0" eaLnBrk="1" latinLnBrk="0" hangingPunct="1">
+        <a:defRPr sz="4245" kern="1200">
           <a:solidFill>
             <a:schemeClr val="tx1"/>
           </a:solidFill>
@@ -2939,8 +2939,8 @@
           <a:cs typeface="+mn-cs"/>
         </a:defRPr>
       </a:lvl8pPr>
-      <a:lvl9pPr marL="8553298" algn="l" defTabSz="2138324" rtl="0" eaLnBrk="1" latinLnBrk="0" hangingPunct="1">
-        <a:defRPr sz="4209" kern="1200">
+      <a:lvl9pPr marL="8625352" algn="l" defTabSz="2156338" rtl="0" eaLnBrk="1" latinLnBrk="0" hangingPunct="1">
+        <a:defRPr sz="4245" kern="1200">
           <a:solidFill>
             <a:schemeClr val="tx1"/>
           </a:solidFill>
@@ -2985,10 +2985,10 @@
         </p:nvGrpSpPr>
         <p:grpSpPr>
           <a:xfrm>
-            <a:off x="12582819" y="17976639"/>
-            <a:ext cx="11660476" cy="14719969"/>
-            <a:chOff x="13241567" y="18236730"/>
-            <a:chExt cx="11001728" cy="13888378"/>
+            <a:off x="12672513" y="18066333"/>
+            <a:ext cx="8800805" cy="11469963"/>
+            <a:chOff x="13241566" y="18236729"/>
+            <a:chExt cx="8303611" cy="10821978"/>
           </a:xfrm>
         </p:grpSpPr>
         <p:pic>
@@ -3005,7 +3005,7 @@
             </p:cNvPicPr>
             <p:nvPr/>
           </p:nvPicPr>
-          <p:blipFill>
+          <p:blipFill rotWithShape="1">
             <a:blip r:embed="rId2">
               <a:extLst>
                 <a:ext uri="{28A0092B-C50C-407E-A947-70E740481C1C}">
@@ -3013,13 +3013,13 @@
                 </a:ext>
               </a:extLst>
             </a:blip>
-            <a:srcRect/>
+            <a:srcRect r="24525" b="22079"/>
             <a:stretch/>
           </p:blipFill>
           <p:spPr>
             <a:xfrm>
-              <a:off x="13241567" y="18236730"/>
-              <a:ext cx="11001728" cy="13888378"/>
+              <a:off x="13241566" y="18236729"/>
+              <a:ext cx="8303611" cy="10821978"/>
             </a:xfrm>
             <a:prstGeom prst="rect">
               <a:avLst/>
@@ -3041,7 +3041,7 @@
           <p:spPr>
             <a:xfrm>
               <a:off x="14734523" y="25534508"/>
-              <a:ext cx="3182162" cy="2062103"/>
+              <a:ext cx="3182162" cy="1945606"/>
             </a:xfrm>
             <a:prstGeom prst="rect">
               <a:avLst/>
@@ -3091,7 +3091,7 @@
         </p:nvSpPr>
         <p:spPr>
           <a:xfrm>
-            <a:off x="19139772" y="29762224"/>
+            <a:off x="19229467" y="29851918"/>
             <a:ext cx="76925" cy="92310"/>
           </a:xfrm>
           <a:prstGeom prst="rect">
@@ -3157,7 +3157,7 @@
         </p:blipFill>
         <p:spPr>
           <a:xfrm>
-            <a:off x="0" y="0"/>
+            <a:off x="89695" y="89695"/>
             <a:ext cx="21383625" cy="2523609"/>
           </a:xfrm>
           <a:prstGeom prst="rect">
@@ -3193,7 +3193,7 @@
         </p:blipFill>
         <p:spPr>
           <a:xfrm>
-            <a:off x="0" y="29193385"/>
+            <a:off x="89695" y="29283079"/>
             <a:ext cx="21383625" cy="1081828"/>
           </a:xfrm>
           <a:prstGeom prst="rect">
@@ -3215,7 +3215,7 @@
         </p:nvSpPr>
         <p:spPr>
           <a:xfrm>
-            <a:off x="419100" y="266700"/>
+            <a:off x="508794" y="356395"/>
             <a:ext cx="18821400" cy="1200329"/>
           </a:xfrm>
           <a:prstGeom prst="rect">
@@ -3261,7 +3261,7 @@
         </p:nvSpPr>
         <p:spPr>
           <a:xfrm>
-            <a:off x="419100" y="1518443"/>
+            <a:off x="508794" y="1608138"/>
             <a:ext cx="18402300" cy="646331"/>
           </a:xfrm>
           <a:prstGeom prst="rect">
@@ -3282,7 +3282,7 @@
                 </a:solidFill>
                 <a:latin typeface="Arial Black" panose="020B0A04020102020204" pitchFamily="34" charset="0"/>
               </a:rPr>
-              <a:t>Samuel Parker</a:t>
+              <a:t>Samuel Parker, Kaushik Mahata</a:t>
             </a:r>
             <a:endParaRPr lang="en-AU" sz="3600" dirty="0">
               <a:solidFill>
@@ -3307,7 +3307,7 @@
         </p:nvSpPr>
         <p:spPr>
           <a:xfrm>
-            <a:off x="419100" y="2763252"/>
+            <a:off x="508794" y="2852946"/>
             <a:ext cx="9220200" cy="707886"/>
           </a:xfrm>
           <a:prstGeom prst="rect">
@@ -3347,7 +3347,7 @@
         </p:nvSpPr>
         <p:spPr>
           <a:xfrm>
-            <a:off x="419100" y="3471138"/>
+            <a:off x="508794" y="3560832"/>
             <a:ext cx="11734800" cy="3046988"/>
           </a:xfrm>
           <a:prstGeom prst="rect">
@@ -3404,7 +3404,7 @@
         </p:nvSpPr>
         <p:spPr>
           <a:xfrm>
-            <a:off x="419099" y="6506862"/>
+            <a:off x="508793" y="6596557"/>
             <a:ext cx="11734800" cy="2062103"/>
           </a:xfrm>
           <a:prstGeom prst="rect">
@@ -3454,7 +3454,7 @@
         </p:nvGrpSpPr>
         <p:grpSpPr>
           <a:xfrm>
-            <a:off x="12582819" y="3452460"/>
+            <a:off x="12672514" y="3542154"/>
             <a:ext cx="8421329" cy="4739758"/>
             <a:chOff x="11744325" y="6382752"/>
             <a:chExt cx="9220200" cy="4739758"/>
@@ -3572,7 +3572,7 @@
         </p:nvGrpSpPr>
         <p:grpSpPr>
           <a:xfrm>
-            <a:off x="2094614" y="8446259"/>
+            <a:off x="2184308" y="8535953"/>
             <a:ext cx="17027306" cy="4786526"/>
             <a:chOff x="2094614" y="10427459"/>
             <a:chExt cx="17027306" cy="4786526"/>
@@ -3678,10 +3678,10 @@
         </p:nvGrpSpPr>
         <p:grpSpPr>
           <a:xfrm>
-            <a:off x="7772400" y="21649228"/>
-            <a:ext cx="7415973" cy="7675980"/>
+            <a:off x="7862095" y="21738921"/>
+            <a:ext cx="7415973" cy="7497658"/>
             <a:chOff x="2086815" y="15693923"/>
-            <a:chExt cx="6362700" cy="6585779"/>
+            <a:chExt cx="6362700" cy="6432784"/>
           </a:xfrm>
         </p:grpSpPr>
         <p:pic>
@@ -3735,7 +3735,7 @@
           <p:spPr>
             <a:xfrm>
               <a:off x="2086815" y="21202484"/>
-              <a:ext cx="6362700" cy="1077218"/>
+              <a:ext cx="6362700" cy="924223"/>
             </a:xfrm>
             <a:prstGeom prst="rect">
               <a:avLst/>
@@ -3797,10 +3797,10 @@
         </p:nvGrpSpPr>
         <p:grpSpPr>
           <a:xfrm>
-            <a:off x="419102" y="13694582"/>
-            <a:ext cx="10003662" cy="5601532"/>
+            <a:off x="508796" y="13784276"/>
+            <a:ext cx="9675874" cy="5601532"/>
             <a:chOff x="10869672" y="6382752"/>
-            <a:chExt cx="10094853" cy="5601532"/>
+            <a:chExt cx="9764077" cy="5601532"/>
           </a:xfrm>
         </p:grpSpPr>
         <p:sp>
@@ -3858,7 +3858,7 @@
           <p:spPr>
             <a:xfrm>
               <a:off x="10869672" y="7090637"/>
-              <a:ext cx="10094853" cy="4893647"/>
+              <a:ext cx="9764077" cy="4893647"/>
             </a:xfrm>
             <a:prstGeom prst="rect">
               <a:avLst/>
@@ -3877,7 +3877,7 @@
                   <a:latin typeface="Arial" panose="020B0604020202020204" pitchFamily="34" charset="0"/>
                   <a:cs typeface="Arial" panose="020B0604020202020204" pitchFamily="34" charset="0"/>
                 </a:rPr>
-                <a:t>Motor intent is encoded in the firing rates of neurons. This is detected by examining the frequency content of the EEG signals. In a novel application of the Discrete Cosine Transform (</a:t>
+                <a:t>Motor intent is encoded in the firing rates of neurons. This is detected by examining the frequency content of the EEG signals. Applying the Discrete Cosine Transform (</a:t>
               </a:r>
               <a:r>
                 <a:rPr lang="en-US" sz="3200" b="1" dirty="0">
@@ -3901,21 +3901,14 @@
                   <a:latin typeface="Arial" panose="020B0604020202020204" pitchFamily="34" charset="0"/>
                   <a:cs typeface="Arial" panose="020B0604020202020204" pitchFamily="34" charset="0"/>
                 </a:rPr>
-                <a:t>same accuracy in 26% of the time taken by the current state-of-the-art</a:t>
-              </a:r>
-              <a:r>
-                <a:rPr lang="en-US" sz="3600" dirty="0">
-                  <a:latin typeface="Arial" panose="020B0604020202020204" pitchFamily="34" charset="0"/>
-                  <a:cs typeface="Arial" panose="020B0604020202020204" pitchFamily="34" charset="0"/>
-                </a:rPr>
-                <a:t> </a:t>
+                <a:t>same accuracy in 26% of the time taken by benchmark approach </a:t>
               </a:r>
               <a:r>
                 <a:rPr lang="en-US" sz="3200" dirty="0">
                   <a:latin typeface="Arial" panose="020B0604020202020204" pitchFamily="34" charset="0"/>
                   <a:cs typeface="Arial" panose="020B0604020202020204" pitchFamily="34" charset="0"/>
                 </a:rPr>
-                <a:t>(the Short Time Fourier Transform). This is extremely exciting for online BCI systems, where classification time is critical.  </a:t>
+                <a:t>(the Short Time Fourier Transform, or STFT). This is extremely exciting for online BCI systems, where classification time is critical.  </a:t>
               </a:r>
               <a:endParaRPr lang="en-AU" sz="3200" dirty="0">
                 <a:latin typeface="Arial" panose="020B0604020202020204" pitchFamily="34" charset="0"/>
@@ -3939,7 +3932,7 @@
         </p:nvGrpSpPr>
         <p:grpSpPr>
           <a:xfrm>
-            <a:off x="495132" y="20570850"/>
+            <a:off x="584827" y="20660545"/>
             <a:ext cx="7912781" cy="6749765"/>
             <a:chOff x="11744325" y="6448188"/>
             <a:chExt cx="9220200" cy="5796350"/>
@@ -3960,7 +3953,7 @@
           <p:spPr>
             <a:xfrm>
               <a:off x="11744325" y="6448188"/>
-              <a:ext cx="9220200" cy="707886"/>
+              <a:ext cx="9220200" cy="607896"/>
             </a:xfrm>
             <a:prstGeom prst="rect">
               <a:avLst/>
@@ -4057,7 +4050,7 @@
         </p:nvGrpSpPr>
         <p:grpSpPr>
           <a:xfrm>
-            <a:off x="11688709" y="13339075"/>
+            <a:off x="11778403" y="13428770"/>
             <a:ext cx="9402698" cy="6982023"/>
             <a:chOff x="11601450" y="13203881"/>
             <a:chExt cx="9402698" cy="6982023"/>

</xml_diff>